<commit_message>
doplnenie info pre mna co potom tam napisat resp dopisat
</commit_message>
<xml_diff>
--- a/docs/progress-reports/2/ProgressReport2-Cederle-Marek.pptx
+++ b/docs/progress-reports/2/ProgressReport2-Cederle-Marek.pptx
@@ -520,6 +520,287 @@
           <a:bodyPr/>
           <a:lstStyle/>
           <a:p>
+            <a:r>
+              <a:rPr lang="sk-SK" b="1" i="0" dirty="0" err="1">
+                <a:solidFill>
+                  <a:srgbClr val="ECECEC"/>
+                </a:solidFill>
+                <a:effectLst/>
+                <a:highlight>
+                  <a:srgbClr val="212121"/>
+                </a:highlight>
+                <a:latin typeface="Söhne"/>
+              </a:rPr>
+              <a:t>Recuva</a:t>
+            </a:r>
+            <a:r>
+              <a:rPr lang="sk-SK" b="0" i="0" dirty="0">
+                <a:solidFill>
+                  <a:srgbClr val="ECECEC"/>
+                </a:solidFill>
+                <a:effectLst/>
+                <a:highlight>
+                  <a:srgbClr val="212121"/>
+                </a:highlight>
+                <a:latin typeface="Söhne"/>
+              </a:rPr>
+              <a:t>: Široko používaný a ľahko ovládateľný nástroj s pokročilými možnosťami skenovania pre rôzne typy súborov. (Windows)</a:t>
+            </a:r>
+          </a:p>
+          <a:p>
+            <a:r>
+              <a:rPr lang="sk-SK" b="1" i="0" dirty="0" err="1">
+                <a:solidFill>
+                  <a:srgbClr val="ECECEC"/>
+                </a:solidFill>
+                <a:effectLst/>
+                <a:highlight>
+                  <a:srgbClr val="212121"/>
+                </a:highlight>
+                <a:latin typeface="Söhne"/>
+              </a:rPr>
+              <a:t>PhotoRec</a:t>
+            </a:r>
+            <a:r>
+              <a:rPr lang="sk-SK" b="0" i="0" dirty="0">
+                <a:solidFill>
+                  <a:srgbClr val="ECECEC"/>
+                </a:solidFill>
+                <a:effectLst/>
+                <a:highlight>
+                  <a:srgbClr val="212121"/>
+                </a:highlight>
+                <a:latin typeface="Söhne"/>
+              </a:rPr>
+              <a:t>: Špecializovaný na obnovenie stratených obrázkov a multimediálnych súborov z rôznych úložných zariadení. (</a:t>
+            </a:r>
+            <a:r>
+              <a:rPr lang="sk-SK" b="0" i="0" dirty="0" err="1">
+                <a:solidFill>
+                  <a:srgbClr val="ECECEC"/>
+                </a:solidFill>
+                <a:effectLst/>
+                <a:highlight>
+                  <a:srgbClr val="212121"/>
+                </a:highlight>
+                <a:latin typeface="Söhne"/>
+              </a:rPr>
+              <a:t>Crossplatform</a:t>
+            </a:r>
+            <a:r>
+              <a:rPr lang="sk-SK" b="0" i="0" dirty="0">
+                <a:solidFill>
+                  <a:srgbClr val="ECECEC"/>
+                </a:solidFill>
+                <a:effectLst/>
+                <a:highlight>
+                  <a:srgbClr val="212121"/>
+                </a:highlight>
+                <a:latin typeface="Söhne"/>
+              </a:rPr>
+              <a:t>)</a:t>
+            </a:r>
+          </a:p>
+          <a:p>
+            <a:r>
+              <a:rPr lang="sk-SK" b="1" i="0" dirty="0" err="1">
+                <a:solidFill>
+                  <a:srgbClr val="ECECEC"/>
+                </a:solidFill>
+                <a:effectLst/>
+                <a:highlight>
+                  <a:srgbClr val="212121"/>
+                </a:highlight>
+                <a:latin typeface="Söhne"/>
+              </a:rPr>
+              <a:t>TestDisk</a:t>
+            </a:r>
+            <a:r>
+              <a:rPr lang="sk-SK" b="0" i="0" dirty="0">
+                <a:solidFill>
+                  <a:srgbClr val="ECECEC"/>
+                </a:solidFill>
+                <a:effectLst/>
+                <a:highlight>
+                  <a:srgbClr val="212121"/>
+                </a:highlight>
+                <a:latin typeface="Söhne"/>
+              </a:rPr>
+              <a:t>: Nielen obnovuje vymazané súbory, ale tiež pomáha opraviť tabuľku oddielov a štartovacie sektory. (</a:t>
+            </a:r>
+            <a:r>
+              <a:rPr lang="sk-SK" b="0" i="0" dirty="0" err="1">
+                <a:solidFill>
+                  <a:srgbClr val="ECECEC"/>
+                </a:solidFill>
+                <a:effectLst/>
+                <a:highlight>
+                  <a:srgbClr val="212121"/>
+                </a:highlight>
+                <a:latin typeface="Söhne"/>
+              </a:rPr>
+              <a:t>Crossplatform</a:t>
+            </a:r>
+            <a:r>
+              <a:rPr lang="sk-SK" b="0" i="0" dirty="0">
+                <a:solidFill>
+                  <a:srgbClr val="ECECEC"/>
+                </a:solidFill>
+                <a:effectLst/>
+                <a:highlight>
+                  <a:srgbClr val="212121"/>
+                </a:highlight>
+                <a:latin typeface="Söhne"/>
+              </a:rPr>
+              <a:t>)</a:t>
+            </a:r>
+          </a:p>
+          <a:p>
+            <a:r>
+              <a:rPr lang="sk-SK" b="1" i="0" u="sng" dirty="0">
+                <a:solidFill>
+                  <a:srgbClr val="ECECEC"/>
+                </a:solidFill>
+                <a:effectLst/>
+                <a:highlight>
+                  <a:srgbClr val="212121"/>
+                </a:highlight>
+                <a:latin typeface="Söhne"/>
+              </a:rPr>
+              <a:t>Poznámka</a:t>
+            </a:r>
+            <a:r>
+              <a:rPr lang="sk-SK" b="0" i="0" dirty="0">
+                <a:solidFill>
+                  <a:srgbClr val="ECECEC"/>
+                </a:solidFill>
+                <a:effectLst/>
+                <a:highlight>
+                  <a:srgbClr val="212121"/>
+                </a:highlight>
+                <a:latin typeface="Söhne"/>
+              </a:rPr>
+              <a:t>:  </a:t>
+            </a:r>
+            <a:r>
+              <a:rPr lang="sk-SK" b="0" i="0" dirty="0" err="1">
+                <a:solidFill>
+                  <a:srgbClr val="ECECEC"/>
+                </a:solidFill>
+                <a:effectLst/>
+                <a:highlight>
+                  <a:srgbClr val="212121"/>
+                </a:highlight>
+                <a:latin typeface="Söhne"/>
+              </a:rPr>
+              <a:t>PhotoRec</a:t>
+            </a:r>
+            <a:r>
+              <a:rPr lang="sk-SK" b="0" i="0" dirty="0">
+                <a:solidFill>
+                  <a:srgbClr val="ECECEC"/>
+                </a:solidFill>
+                <a:effectLst/>
+                <a:highlight>
+                  <a:srgbClr val="212121"/>
+                </a:highlight>
+                <a:latin typeface="Söhne"/>
+              </a:rPr>
+              <a:t> aj </a:t>
+            </a:r>
+            <a:r>
+              <a:rPr lang="sk-SK" b="0" i="0" dirty="0" err="1">
+                <a:solidFill>
+                  <a:srgbClr val="ECECEC"/>
+                </a:solidFill>
+                <a:effectLst/>
+                <a:highlight>
+                  <a:srgbClr val="212121"/>
+                </a:highlight>
+                <a:latin typeface="Söhne"/>
+              </a:rPr>
+              <a:t>Testdisk</a:t>
+            </a:r>
+            <a:r>
+              <a:rPr lang="sk-SK" b="0" i="0" dirty="0">
+                <a:solidFill>
+                  <a:srgbClr val="ECECEC"/>
+                </a:solidFill>
+                <a:effectLst/>
+                <a:highlight>
+                  <a:srgbClr val="212121"/>
+                </a:highlight>
+                <a:latin typeface="Söhne"/>
+              </a:rPr>
+              <a:t> sú od rovnakého vývojára</a:t>
+            </a:r>
+          </a:p>
+          <a:p>
+            <a:r>
+              <a:rPr lang="sk-SK" b="1" i="0" dirty="0">
+                <a:solidFill>
+                  <a:srgbClr val="ECECEC"/>
+                </a:solidFill>
+                <a:effectLst/>
+                <a:highlight>
+                  <a:srgbClr val="212121"/>
+                </a:highlight>
+                <a:latin typeface="Söhne"/>
+              </a:rPr>
+              <a:t>Disk </a:t>
+            </a:r>
+            <a:r>
+              <a:rPr lang="sk-SK" b="1" i="0" dirty="0" err="1">
+                <a:solidFill>
+                  <a:srgbClr val="ECECEC"/>
+                </a:solidFill>
+                <a:effectLst/>
+                <a:highlight>
+                  <a:srgbClr val="212121"/>
+                </a:highlight>
+                <a:latin typeface="Söhne"/>
+              </a:rPr>
+              <a:t>Drill</a:t>
+            </a:r>
+            <a:r>
+              <a:rPr lang="sk-SK" b="0" i="0" dirty="0">
+                <a:solidFill>
+                  <a:srgbClr val="ECECEC"/>
+                </a:solidFill>
+                <a:effectLst/>
+                <a:highlight>
+                  <a:srgbClr val="212121"/>
+                </a:highlight>
+                <a:latin typeface="Söhne"/>
+              </a:rPr>
+              <a:t>: (Windows a </a:t>
+            </a:r>
+            <a:r>
+              <a:rPr lang="sk-SK" b="0" i="0" dirty="0" err="1">
+                <a:solidFill>
+                  <a:srgbClr val="ECECEC"/>
+                </a:solidFill>
+                <a:effectLst/>
+                <a:highlight>
+                  <a:srgbClr val="212121"/>
+                </a:highlight>
+                <a:latin typeface="Söhne"/>
+              </a:rPr>
+              <a:t>MacOS</a:t>
+            </a:r>
+            <a:r>
+              <a:rPr lang="sk-SK" b="0" i="0" dirty="0">
+                <a:solidFill>
+                  <a:srgbClr val="ECECEC"/>
+                </a:solidFill>
+                <a:effectLst/>
+                <a:highlight>
+                  <a:srgbClr val="212121"/>
+                </a:highlight>
+                <a:latin typeface="Söhne"/>
+              </a:rPr>
+              <a:t>)</a:t>
+            </a:r>
             <a:endParaRPr lang="sk-SK" dirty="0"/>
           </a:p>
         </p:txBody>
@@ -541,7 +822,7 @@
           <a:p>
             <a:fld id="{5C718C61-028C-4B62-904D-AF06C416AFC9}" type="slidenum">
               <a:rPr lang="sk-SK" smtClean="0"/>
-              <a:t>4</a:t>
+              <a:t>3</a:t>
             </a:fld>
             <a:endParaRPr lang="sk-SK"/>
           </a:p>
@@ -550,7 +831,7 @@
     </p:spTree>
     <p:extLst>
       <p:ext uri="{BB962C8B-B14F-4D97-AF65-F5344CB8AC3E}">
-        <p14:creationId xmlns:p14="http://schemas.microsoft.com/office/powerpoint/2010/main" val="3028971719"/>
+        <p14:creationId xmlns:p14="http://schemas.microsoft.com/office/powerpoint/2010/main" val="18653187"/>
       </p:ext>
     </p:extLst>
   </p:cSld>
@@ -604,7 +885,222 @@
           <a:bodyPr/>
           <a:lstStyle/>
           <a:p>
+            <a:r>
+              <a:rPr lang="sk-SK" dirty="0"/>
+              <a:t>- Zadarmo, voľno šíriteľný s dostupným zdrojovým kódom (Licencia GNU GPL 2)</a:t>
+            </a:r>
+          </a:p>
+          <a:p>
+            <a:pPr marL="171450" indent="-171450">
+              <a:buFontTx/>
+              <a:buChar char="-"/>
+            </a:pPr>
+            <a:r>
+              <a:rPr lang="sk-SK" dirty="0"/>
+              <a:t>Podpora Windows, </a:t>
+            </a:r>
+            <a:r>
+              <a:rPr lang="sk-SK" dirty="0" err="1"/>
+              <a:t>MacOS</a:t>
+            </a:r>
+            <a:r>
+              <a:rPr lang="sk-SK" dirty="0"/>
+              <a:t>, </a:t>
+            </a:r>
+            <a:r>
+              <a:rPr lang="sk-SK" dirty="0" err="1"/>
+              <a:t>GNU+Linux</a:t>
+            </a:r>
             <a:endParaRPr lang="sk-SK" dirty="0"/>
+          </a:p>
+          <a:p>
+            <a:pPr marL="171450" indent="-171450">
+              <a:buFontTx/>
+              <a:buChar char="-"/>
+            </a:pPr>
+            <a:r>
+              <a:rPr lang="sk-SK" dirty="0"/>
+              <a:t>MBR (</a:t>
+            </a:r>
+            <a:r>
+              <a:rPr lang="sk-SK" dirty="0" err="1"/>
+              <a:t>Master</a:t>
+            </a:r>
+            <a:r>
+              <a:rPr lang="sk-SK" dirty="0"/>
+              <a:t> </a:t>
+            </a:r>
+            <a:r>
+              <a:rPr lang="sk-SK" dirty="0" err="1"/>
+              <a:t>Boot</a:t>
+            </a:r>
+            <a:r>
+              <a:rPr lang="sk-SK" dirty="0"/>
+              <a:t> </a:t>
+            </a:r>
+            <a:r>
+              <a:rPr lang="sk-SK" dirty="0" err="1"/>
+              <a:t>Record</a:t>
+            </a:r>
+            <a:r>
+              <a:rPr lang="sk-SK" dirty="0"/>
+              <a:t>) – staré disky, GPT (GUID </a:t>
+            </a:r>
+            <a:r>
+              <a:rPr lang="sk-SK" dirty="0" err="1"/>
+              <a:t>Partition</a:t>
+            </a:r>
+            <a:r>
+              <a:rPr lang="sk-SK" dirty="0"/>
+              <a:t> Table) – nové disky</a:t>
+            </a:r>
+          </a:p>
+          <a:p>
+            <a:pPr marL="171450" indent="-171450">
+              <a:buFontTx/>
+              <a:buChar char="-"/>
+            </a:pPr>
+            <a:r>
+              <a:rPr lang="sk-SK" dirty="0"/>
+              <a:t>NTFS, </a:t>
+            </a:r>
+            <a:r>
+              <a:rPr lang="sk-SK" dirty="0" err="1"/>
+              <a:t>ext</a:t>
+            </a:r>
+            <a:r>
+              <a:rPr lang="sk-SK" dirty="0"/>
+              <a:t>, FAT, </a:t>
+            </a:r>
+            <a:r>
+              <a:rPr lang="sk-SK" dirty="0" err="1"/>
+              <a:t>exFAT</a:t>
+            </a:r>
+            <a:r>
+              <a:rPr lang="sk-SK" dirty="0"/>
+              <a:t> </a:t>
+            </a:r>
+          </a:p>
+          <a:p>
+            <a:endParaRPr lang="sk-SK" dirty="0"/>
+          </a:p>
+        </p:txBody>
+      </p:sp>
+      <p:sp>
+        <p:nvSpPr>
+          <p:cNvPr id="4" name="Zástupný objekt pre číslo snímky 3"/>
+          <p:cNvSpPr>
+            <a:spLocks noGrp="1"/>
+          </p:cNvSpPr>
+          <p:nvPr>
+            <p:ph type="sldNum" sz="quarter" idx="5"/>
+          </p:nvPr>
+        </p:nvSpPr>
+        <p:spPr/>
+        <p:txBody>
+          <a:bodyPr/>
+          <a:lstStyle/>
+          <a:p>
+            <a:fld id="{5C718C61-028C-4B62-904D-AF06C416AFC9}" type="slidenum">
+              <a:rPr lang="sk-SK" smtClean="0"/>
+              <a:t>4</a:t>
+            </a:fld>
+            <a:endParaRPr lang="sk-SK"/>
+          </a:p>
+        </p:txBody>
+      </p:sp>
+    </p:spTree>
+    <p:extLst>
+      <p:ext uri="{BB962C8B-B14F-4D97-AF65-F5344CB8AC3E}">
+        <p14:creationId xmlns:p14="http://schemas.microsoft.com/office/powerpoint/2010/main" val="3028971719"/>
+      </p:ext>
+    </p:extLst>
+  </p:cSld>
+  <p:clrMapOvr>
+    <a:masterClrMapping/>
+  </p:clrMapOvr>
+</p:notes>
+</file>
+
+<file path=ppt/notesSlides/notesSlide3.xml><?xml version="1.0" encoding="utf-8"?>
+<p:notes xmlns:a="http://schemas.openxmlformats.org/drawingml/2006/main" xmlns:r="http://schemas.openxmlformats.org/officeDocument/2006/relationships" xmlns:p="http://schemas.openxmlformats.org/presentationml/2006/main">
+  <p:cSld>
+    <p:spTree>
+      <p:nvGrpSpPr>
+        <p:cNvPr id="1" name=""/>
+        <p:cNvGrpSpPr/>
+        <p:nvPr/>
+      </p:nvGrpSpPr>
+      <p:grpSpPr>
+        <a:xfrm>
+          <a:off x="0" y="0"/>
+          <a:ext cx="0" cy="0"/>
+          <a:chOff x="0" y="0"/>
+          <a:chExt cx="0" cy="0"/>
+        </a:xfrm>
+      </p:grpSpPr>
+      <p:sp>
+        <p:nvSpPr>
+          <p:cNvPr id="2" name="Zástupný objekt pre obrázok snímky 1"/>
+          <p:cNvSpPr>
+            <a:spLocks noGrp="1" noRot="1" noChangeAspect="1"/>
+          </p:cNvSpPr>
+          <p:nvPr>
+            <p:ph type="sldImg"/>
+          </p:nvPr>
+        </p:nvSpPr>
+        <p:spPr/>
+      </p:sp>
+      <p:sp>
+        <p:nvSpPr>
+          <p:cNvPr id="3" name="Zástupný objekt pre poznámky 2"/>
+          <p:cNvSpPr>
+            <a:spLocks noGrp="1"/>
+          </p:cNvSpPr>
+          <p:nvPr>
+            <p:ph type="body" idx="1"/>
+          </p:nvPr>
+        </p:nvSpPr>
+        <p:spPr/>
+        <p:txBody>
+          <a:bodyPr/>
+          <a:lstStyle/>
+          <a:p>
+            <a:r>
+              <a:rPr lang="sk-SK" b="1" u="sng" dirty="0"/>
+              <a:t>Poznámka:</a:t>
+            </a:r>
+            <a:r>
+              <a:rPr lang="sk-SK" dirty="0"/>
+              <a:t> NIKDY NEZAPISOVAŤ NA DISK Z KTORÉHO CHCEME OBNOVIŤ DÁTA</a:t>
+            </a:r>
+          </a:p>
+          <a:p>
+            <a:r>
+              <a:rPr lang="sk-SK" b="1" u="sng" dirty="0"/>
+              <a:t>Poznámka:</a:t>
+            </a:r>
+            <a:r>
+              <a:rPr lang="sk-SK" dirty="0"/>
+              <a:t> Vytvorenie jedného disku a na ňom viacej partícií. Potom som to ale skúsil aj samostatne lebo tak to reálne nikto nebude mať.</a:t>
+            </a:r>
+          </a:p>
+          <a:p>
+            <a:endParaRPr lang="sk-SK" dirty="0"/>
+          </a:p>
+          <a:p>
+            <a:r>
+              <a:rPr lang="sk-SK" dirty="0"/>
+              <a:t>Naformátovanie diskov znamená vytvorenie </a:t>
+            </a:r>
+            <a:r>
+              <a:rPr lang="sk-SK" dirty="0" err="1"/>
+              <a:t>partition</a:t>
+            </a:r>
+            <a:r>
+              <a:rPr lang="sk-SK" dirty="0"/>
+              <a:t> table a rozdelenie disku na partície. Následné vytvorenie súborových systémov na daných partíciách.</a:t>
+            </a:r>
           </a:p>
         </p:txBody>
       </p:sp>
@@ -4319,10 +4815,227 @@
           <a:bodyPr/>
           <a:lstStyle/>
           <a:p>
+            <a:r>
+              <a:rPr lang="sk-SK" dirty="0" err="1"/>
+              <a:t>Recuva</a:t>
+            </a:r>
             <a:endParaRPr lang="sk-SK" dirty="0"/>
           </a:p>
-        </p:txBody>
-      </p:sp>
+          <a:p>
+            <a:r>
+              <a:rPr lang="sk-SK" dirty="0" err="1"/>
+              <a:t>PhotoRec</a:t>
+            </a:r>
+            <a:endParaRPr lang="sk-SK" dirty="0"/>
+          </a:p>
+          <a:p>
+            <a:r>
+              <a:rPr lang="sk-SK" dirty="0" err="1"/>
+              <a:t>TestDisk</a:t>
+            </a:r>
+            <a:endParaRPr lang="sk-SK" dirty="0"/>
+          </a:p>
+          <a:p>
+            <a:r>
+              <a:rPr lang="sk-SK" dirty="0"/>
+              <a:t>Disk </a:t>
+            </a:r>
+            <a:r>
+              <a:rPr lang="sk-SK" dirty="0" err="1"/>
+              <a:t>Drill</a:t>
+            </a:r>
+            <a:endParaRPr lang="sk-SK" dirty="0"/>
+          </a:p>
+        </p:txBody>
+      </p:sp>
+      <p:pic>
+        <p:nvPicPr>
+          <p:cNvPr id="2050" name="Picture 2" descr="Recuva - Wikipedia">
+            <a:extLst>
+              <a:ext uri="{FF2B5EF4-FFF2-40B4-BE49-F238E27FC236}">
+                <a16:creationId xmlns:a16="http://schemas.microsoft.com/office/drawing/2014/main" id="{E40EF4D6-C315-1692-E05B-1F1ACFFA674F}"/>
+              </a:ext>
+            </a:extLst>
+          </p:cNvPr>
+          <p:cNvPicPr>
+            <a:picLocks noChangeAspect="1" noChangeArrowheads="1"/>
+          </p:cNvPicPr>
+          <p:nvPr/>
+        </p:nvPicPr>
+        <p:blipFill>
+          <a:blip r:embed="rId3">
+            <a:extLst>
+              <a:ext uri="{28A0092B-C50C-407E-A947-70E740481C1C}">
+                <a14:useLocalDpi xmlns:a14="http://schemas.microsoft.com/office/drawing/2010/main" val="0"/>
+              </a:ext>
+            </a:extLst>
+          </a:blip>
+          <a:srcRect/>
+          <a:stretch>
+            <a:fillRect/>
+          </a:stretch>
+        </p:blipFill>
+        <p:spPr bwMode="auto">
+          <a:xfrm>
+            <a:off x="5780117" y="1637924"/>
+            <a:ext cx="1518458" cy="1518458"/>
+          </a:xfrm>
+          <a:prstGeom prst="rect">
+            <a:avLst/>
+          </a:prstGeom>
+          <a:noFill/>
+          <a:extLst>
+            <a:ext uri="{909E8E84-426E-40DD-AFC4-6F175D3DCCD1}">
+              <a14:hiddenFill xmlns:a14="http://schemas.microsoft.com/office/drawing/2010/main">
+                <a:solidFill>
+                  <a:srgbClr val="FFFFFF"/>
+                </a:solidFill>
+              </a14:hiddenFill>
+            </a:ext>
+          </a:extLst>
+        </p:spPr>
+      </p:pic>
+      <p:pic>
+        <p:nvPicPr>
+          <p:cNvPr id="2052" name="Picture 4" descr="PhotoRec - Wikipedia">
+            <a:extLst>
+              <a:ext uri="{FF2B5EF4-FFF2-40B4-BE49-F238E27FC236}">
+                <a16:creationId xmlns:a16="http://schemas.microsoft.com/office/drawing/2014/main" id="{C4A39D0A-AE76-A4FD-4AFF-38AD8C13CB25}"/>
+              </a:ext>
+            </a:extLst>
+          </p:cNvPr>
+          <p:cNvPicPr>
+            <a:picLocks noChangeAspect="1" noChangeArrowheads="1"/>
+          </p:cNvPicPr>
+          <p:nvPr/>
+        </p:nvPicPr>
+        <p:blipFill>
+          <a:blip r:embed="rId4">
+            <a:extLst>
+              <a:ext uri="{28A0092B-C50C-407E-A947-70E740481C1C}">
+                <a14:useLocalDpi xmlns:a14="http://schemas.microsoft.com/office/drawing/2010/main" val="0"/>
+              </a:ext>
+            </a:extLst>
+          </a:blip>
+          <a:srcRect/>
+          <a:stretch>
+            <a:fillRect/>
+          </a:stretch>
+        </p:blipFill>
+        <p:spPr bwMode="auto">
+          <a:xfrm>
+            <a:off x="8054668" y="1637924"/>
+            <a:ext cx="1518458" cy="1518458"/>
+          </a:xfrm>
+          <a:prstGeom prst="rect">
+            <a:avLst/>
+          </a:prstGeom>
+          <a:noFill/>
+          <a:extLst>
+            <a:ext uri="{909E8E84-426E-40DD-AFC4-6F175D3DCCD1}">
+              <a14:hiddenFill xmlns:a14="http://schemas.microsoft.com/office/drawing/2010/main">
+                <a:solidFill>
+                  <a:srgbClr val="FFFFFF"/>
+                </a:solidFill>
+              </a14:hiddenFill>
+            </a:ext>
+          </a:extLst>
+        </p:spPr>
+      </p:pic>
+      <p:pic>
+        <p:nvPicPr>
+          <p:cNvPr id="4" name="Picture 2" descr="upload.wikimedia.org/wikipedia/commons/thumb/a/a3/...">
+            <a:extLst>
+              <a:ext uri="{FF2B5EF4-FFF2-40B4-BE49-F238E27FC236}">
+                <a16:creationId xmlns:a16="http://schemas.microsoft.com/office/drawing/2014/main" id="{E255C88D-FC70-E05B-48A9-67431FA61D26}"/>
+              </a:ext>
+            </a:extLst>
+          </p:cNvPr>
+          <p:cNvPicPr>
+            <a:picLocks noChangeAspect="1" noChangeArrowheads="1"/>
+          </p:cNvPicPr>
+          <p:nvPr/>
+        </p:nvPicPr>
+        <p:blipFill>
+          <a:blip r:embed="rId5">
+            <a:extLst>
+              <a:ext uri="{28A0092B-C50C-407E-A947-70E740481C1C}">
+                <a14:useLocalDpi xmlns:a14="http://schemas.microsoft.com/office/drawing/2010/main" val="0"/>
+              </a:ext>
+            </a:extLst>
+          </a:blip>
+          <a:srcRect/>
+          <a:stretch>
+            <a:fillRect/>
+          </a:stretch>
+        </p:blipFill>
+        <p:spPr bwMode="auto">
+          <a:xfrm>
+            <a:off x="8000665" y="3429000"/>
+            <a:ext cx="1566613" cy="1518458"/>
+          </a:xfrm>
+          <a:prstGeom prst="rect">
+            <a:avLst/>
+          </a:prstGeom>
+          <a:noFill/>
+          <a:extLst>
+            <a:ext uri="{909E8E84-426E-40DD-AFC4-6F175D3DCCD1}">
+              <a14:hiddenFill xmlns:a14="http://schemas.microsoft.com/office/drawing/2010/main">
+                <a:solidFill>
+                  <a:srgbClr val="FFFFFF"/>
+                </a:solidFill>
+              </a14:hiddenFill>
+            </a:ext>
+          </a:extLst>
+        </p:spPr>
+      </p:pic>
+      <p:pic>
+        <p:nvPicPr>
+          <p:cNvPr id="2054" name="Picture 6" descr="Disk Drill Data Recovery - Official app in the Microsoft Store">
+            <a:extLst>
+              <a:ext uri="{FF2B5EF4-FFF2-40B4-BE49-F238E27FC236}">
+                <a16:creationId xmlns:a16="http://schemas.microsoft.com/office/drawing/2014/main" id="{6301B957-CC95-575C-3CB6-1CEF4741D2C6}"/>
+              </a:ext>
+            </a:extLst>
+          </p:cNvPr>
+          <p:cNvPicPr>
+            <a:picLocks noChangeAspect="1" noChangeArrowheads="1"/>
+          </p:cNvPicPr>
+          <p:nvPr/>
+        </p:nvPicPr>
+        <p:blipFill>
+          <a:blip r:embed="rId6">
+            <a:extLst>
+              <a:ext uri="{28A0092B-C50C-407E-A947-70E740481C1C}">
+                <a14:useLocalDpi xmlns:a14="http://schemas.microsoft.com/office/drawing/2010/main" val="0"/>
+              </a:ext>
+            </a:extLst>
+          </a:blip>
+          <a:srcRect/>
+          <a:stretch>
+            <a:fillRect/>
+          </a:stretch>
+        </p:blipFill>
+        <p:spPr bwMode="auto">
+          <a:xfrm>
+            <a:off x="5780117" y="3429000"/>
+            <a:ext cx="1672487" cy="1672487"/>
+          </a:xfrm>
+          <a:prstGeom prst="rect">
+            <a:avLst/>
+          </a:prstGeom>
+          <a:noFill/>
+          <a:extLst>
+            <a:ext uri="{909E8E84-426E-40DD-AFC4-6F175D3DCCD1}">
+              <a14:hiddenFill xmlns:a14="http://schemas.microsoft.com/office/drawing/2010/main">
+                <a:solidFill>
+                  <a:srgbClr val="FFFFFF"/>
+                </a:solidFill>
+              </a14:hiddenFill>
+            </a:ext>
+          </a:extLst>
+        </p:spPr>
+      </p:pic>
     </p:spTree>
     <p:extLst>
       <p:ext uri="{BB962C8B-B14F-4D97-AF65-F5344CB8AC3E}">
@@ -4407,10 +5120,145 @@
           <a:bodyPr/>
           <a:lstStyle/>
           <a:p>
+            <a:r>
+              <a:rPr lang="sk-SK" dirty="0"/>
+              <a:t>FOSS (</a:t>
+            </a:r>
+            <a:r>
+              <a:rPr lang="sk-SK" dirty="0" err="1"/>
+              <a:t>Free</a:t>
+            </a:r>
+            <a:r>
+              <a:rPr lang="sk-SK" dirty="0"/>
+              <a:t> &amp; </a:t>
+            </a:r>
+            <a:r>
+              <a:rPr lang="sk-SK" dirty="0" err="1"/>
+              <a:t>Open</a:t>
+            </a:r>
+            <a:r>
+              <a:rPr lang="sk-SK" dirty="0"/>
+              <a:t> </a:t>
+            </a:r>
+            <a:r>
+              <a:rPr lang="sk-SK" dirty="0" err="1"/>
+              <a:t>Source</a:t>
+            </a:r>
+            <a:r>
+              <a:rPr lang="sk-SK" dirty="0"/>
+              <a:t>)</a:t>
+            </a:r>
+          </a:p>
+          <a:p>
+            <a:r>
+              <a:rPr lang="sk-SK" dirty="0" err="1"/>
+              <a:t>Crossplatform</a:t>
+            </a:r>
             <a:endParaRPr lang="sk-SK" dirty="0"/>
           </a:p>
-        </p:txBody>
-      </p:sp>
+          <a:p>
+            <a:r>
+              <a:rPr lang="sk-SK" dirty="0"/>
+              <a:t>Podpora viacero typov „</a:t>
+            </a:r>
+            <a:r>
+              <a:rPr lang="sk-SK" dirty="0" err="1"/>
+              <a:t>partition</a:t>
+            </a:r>
+            <a:r>
+              <a:rPr lang="sk-SK" dirty="0"/>
+              <a:t> table“</a:t>
+            </a:r>
+          </a:p>
+          <a:p>
+            <a:r>
+              <a:rPr lang="sk-SK" dirty="0"/>
+              <a:t>Podpora viacero súborových systémov</a:t>
+            </a:r>
+          </a:p>
+          <a:p>
+            <a:r>
+              <a:rPr lang="sk-SK" dirty="0"/>
+              <a:t>Obnovenie súborov</a:t>
+            </a:r>
+          </a:p>
+          <a:p>
+            <a:r>
+              <a:rPr lang="sk-SK" dirty="0"/>
+              <a:t>Obnovenie partícií</a:t>
+            </a:r>
+          </a:p>
+          <a:p>
+            <a:r>
+              <a:rPr lang="sk-SK" dirty="0"/>
+              <a:t>Jednoduchá a </a:t>
+            </a:r>
+            <a:r>
+              <a:rPr lang="sk-SK" dirty="0" err="1"/>
+              <a:t>lightweight</a:t>
+            </a:r>
+            <a:r>
+              <a:rPr lang="sk-SK" dirty="0"/>
+              <a:t> CLI </a:t>
+            </a:r>
+            <a:r>
+              <a:rPr lang="sk-SK" dirty="0" err="1"/>
+              <a:t>appka</a:t>
+            </a:r>
+            <a:endParaRPr lang="sk-SK" dirty="0"/>
+          </a:p>
+          <a:p>
+            <a:endParaRPr lang="sk-SK" dirty="0"/>
+          </a:p>
+        </p:txBody>
+      </p:sp>
+      <p:pic>
+        <p:nvPicPr>
+          <p:cNvPr id="1026" name="Picture 2" descr="upload.wikimedia.org/wikipedia/commons/thumb/a/a3/...">
+            <a:extLst>
+              <a:ext uri="{FF2B5EF4-FFF2-40B4-BE49-F238E27FC236}">
+                <a16:creationId xmlns:a16="http://schemas.microsoft.com/office/drawing/2014/main" id="{ECC44B1E-C1DC-24FE-C215-9E2AF03D07FD}"/>
+              </a:ext>
+            </a:extLst>
+          </p:cNvPr>
+          <p:cNvPicPr>
+            <a:picLocks noChangeAspect="1" noChangeArrowheads="1"/>
+          </p:cNvPicPr>
+          <p:nvPr/>
+        </p:nvPicPr>
+        <p:blipFill>
+          <a:blip r:embed="rId3">
+            <a:extLst>
+              <a:ext uri="{28A0092B-C50C-407E-A947-70E740481C1C}">
+                <a14:useLocalDpi xmlns:a14="http://schemas.microsoft.com/office/drawing/2010/main" val="0"/>
+              </a:ext>
+            </a:extLst>
+          </a:blip>
+          <a:srcRect/>
+          <a:stretch>
+            <a:fillRect/>
+          </a:stretch>
+        </p:blipFill>
+        <p:spPr bwMode="auto">
+          <a:xfrm>
+            <a:off x="8026924" y="1690688"/>
+            <a:ext cx="2929500" cy="2839453"/>
+          </a:xfrm>
+          <a:prstGeom prst="rect">
+            <a:avLst/>
+          </a:prstGeom>
+          <a:noFill/>
+          <a:extLst>
+            <a:ext uri="{909E8E84-426E-40DD-AFC4-6F175D3DCCD1}">
+              <a14:hiddenFill xmlns:a14="http://schemas.microsoft.com/office/drawing/2010/main">
+                <a:solidFill>
+                  <a:srgbClr val="FFFFFF"/>
+                </a:solidFill>
+              </a14:hiddenFill>
+            </a:ext>
+          </a:extLst>
+        </p:spPr>
+      </p:pic>
     </p:spTree>
     <p:extLst>
       <p:ext uri="{BB962C8B-B14F-4D97-AF65-F5344CB8AC3E}">
@@ -4495,6 +5343,86 @@
           <a:bodyPr/>
           <a:lstStyle/>
           <a:p>
+            <a:r>
+              <a:rPr lang="sk-SK" dirty="0"/>
+              <a:t>Príprava na experimentovanie:</a:t>
+            </a:r>
+          </a:p>
+          <a:p>
+            <a:pPr lvl="1"/>
+            <a:r>
+              <a:rPr lang="sk-SK" dirty="0"/>
+              <a:t>Vytvorenie virtuálneho stroja s </a:t>
+            </a:r>
+            <a:r>
+              <a:rPr lang="sk-SK" dirty="0" err="1"/>
+              <a:t>Arch</a:t>
+            </a:r>
+            <a:r>
+              <a:rPr lang="sk-SK" dirty="0"/>
+              <a:t> Linux</a:t>
+            </a:r>
+          </a:p>
+          <a:p>
+            <a:pPr lvl="1"/>
+            <a:r>
+              <a:rPr lang="sk-SK" dirty="0"/>
+              <a:t>Nastavenie prostredia</a:t>
+            </a:r>
+          </a:p>
+          <a:p>
+            <a:pPr lvl="1"/>
+            <a:r>
+              <a:rPr lang="sk-SK" dirty="0"/>
+              <a:t>Stiahnutie </a:t>
+            </a:r>
+            <a:r>
+              <a:rPr lang="sk-SK" dirty="0" err="1"/>
+              <a:t>nástojov</a:t>
+            </a:r>
+            <a:r>
+              <a:rPr lang="sk-SK" dirty="0"/>
+              <a:t> a </a:t>
+            </a:r>
+            <a:r>
+              <a:rPr lang="sk-SK" dirty="0" err="1"/>
+              <a:t>dependencies</a:t>
+            </a:r>
+            <a:endParaRPr lang="sk-SK" dirty="0"/>
+          </a:p>
+          <a:p>
+            <a:pPr lvl="1"/>
+            <a:r>
+              <a:rPr lang="sk-SK" dirty="0"/>
+              <a:t>Vytvorenie virtuálnych diskov</a:t>
+            </a:r>
+          </a:p>
+          <a:p>
+            <a:pPr lvl="1"/>
+            <a:r>
+              <a:rPr lang="sk-SK" dirty="0"/>
+              <a:t> Naformátovanie diskov</a:t>
+            </a:r>
+          </a:p>
+          <a:p>
+            <a:pPr lvl="1"/>
+            <a:r>
+              <a:rPr lang="sk-SK" dirty="0" err="1"/>
+              <a:t>Mountnutie</a:t>
+            </a:r>
+            <a:r>
+              <a:rPr lang="sk-SK" dirty="0"/>
+              <a:t> diskov do systému</a:t>
+            </a:r>
+          </a:p>
+          <a:p>
+            <a:pPr lvl="1"/>
+            <a:r>
+              <a:rPr lang="sk-SK" dirty="0"/>
+              <a:t>Začiatok experimentovania</a:t>
+            </a:r>
+          </a:p>
+          <a:p>
             <a:endParaRPr lang="sk-SK" dirty="0"/>
           </a:p>
         </p:txBody>
@@ -4529,56 +5457,6 @@
           <a:chExt cx="0" cy="0"/>
         </a:xfrm>
       </p:grpSpPr>
-      <p:sp>
-        <p:nvSpPr>
-          <p:cNvPr id="2" name="Nadpis 1">
-            <a:extLst>
-              <a:ext uri="{FF2B5EF4-FFF2-40B4-BE49-F238E27FC236}">
-                <a16:creationId xmlns:a16="http://schemas.microsoft.com/office/drawing/2014/main" id="{61D4B3FD-C749-69DA-88F1-E85A4F3CD884}"/>
-              </a:ext>
-            </a:extLst>
-          </p:cNvPr>
-          <p:cNvSpPr>
-            <a:spLocks noGrp="1"/>
-          </p:cNvSpPr>
-          <p:nvPr>
-            <p:ph type="title"/>
-          </p:nvPr>
-        </p:nvSpPr>
-        <p:spPr/>
-        <p:txBody>
-          <a:bodyPr/>
-          <a:lstStyle/>
-          <a:p>
-            <a:endParaRPr lang="sk-SK"/>
-          </a:p>
-        </p:txBody>
-      </p:sp>
-      <p:sp>
-        <p:nvSpPr>
-          <p:cNvPr id="3" name="Zástupný objekt pre obsah 2">
-            <a:extLst>
-              <a:ext uri="{FF2B5EF4-FFF2-40B4-BE49-F238E27FC236}">
-                <a16:creationId xmlns:a16="http://schemas.microsoft.com/office/drawing/2014/main" id="{EFFD6B31-C03D-E215-12E3-196DA8B6562B}"/>
-              </a:ext>
-            </a:extLst>
-          </p:cNvPr>
-          <p:cNvSpPr>
-            <a:spLocks noGrp="1"/>
-          </p:cNvSpPr>
-          <p:nvPr>
-            <p:ph idx="1"/>
-          </p:nvPr>
-        </p:nvSpPr>
-        <p:spPr/>
-        <p:txBody>
-          <a:bodyPr/>
-          <a:lstStyle/>
-          <a:p>
-            <a:endParaRPr lang="sk-SK"/>
-          </a:p>
-        </p:txBody>
-      </p:sp>
     </p:spTree>
     <p:extLst>
       <p:ext uri="{BB962C8B-B14F-4D97-AF65-F5344CB8AC3E}">
@@ -4609,56 +5487,6 @@
           <a:chExt cx="0" cy="0"/>
         </a:xfrm>
       </p:grpSpPr>
-      <p:sp>
-        <p:nvSpPr>
-          <p:cNvPr id="2" name="Nadpis 1">
-            <a:extLst>
-              <a:ext uri="{FF2B5EF4-FFF2-40B4-BE49-F238E27FC236}">
-                <a16:creationId xmlns:a16="http://schemas.microsoft.com/office/drawing/2014/main" id="{77CD7D18-6CF9-EBA8-D80F-6E71574C2332}"/>
-              </a:ext>
-            </a:extLst>
-          </p:cNvPr>
-          <p:cNvSpPr>
-            <a:spLocks noGrp="1"/>
-          </p:cNvSpPr>
-          <p:nvPr>
-            <p:ph type="title"/>
-          </p:nvPr>
-        </p:nvSpPr>
-        <p:spPr/>
-        <p:txBody>
-          <a:bodyPr/>
-          <a:lstStyle/>
-          <a:p>
-            <a:endParaRPr lang="sk-SK"/>
-          </a:p>
-        </p:txBody>
-      </p:sp>
-      <p:sp>
-        <p:nvSpPr>
-          <p:cNvPr id="3" name="Zástupný objekt pre obsah 2">
-            <a:extLst>
-              <a:ext uri="{FF2B5EF4-FFF2-40B4-BE49-F238E27FC236}">
-                <a16:creationId xmlns:a16="http://schemas.microsoft.com/office/drawing/2014/main" id="{8F831933-354D-C44E-860F-43345C4D273F}"/>
-              </a:ext>
-            </a:extLst>
-          </p:cNvPr>
-          <p:cNvSpPr>
-            <a:spLocks noGrp="1"/>
-          </p:cNvSpPr>
-          <p:nvPr>
-            <p:ph idx="1"/>
-          </p:nvPr>
-        </p:nvSpPr>
-        <p:spPr/>
-        <p:txBody>
-          <a:bodyPr/>
-          <a:lstStyle/>
-          <a:p>
-            <a:endParaRPr lang="sk-SK"/>
-          </a:p>
-        </p:txBody>
-      </p:sp>
     </p:spTree>
     <p:extLst>
       <p:ext uri="{BB962C8B-B14F-4D97-AF65-F5344CB8AC3E}">
@@ -4689,56 +5517,6 @@
           <a:chExt cx="0" cy="0"/>
         </a:xfrm>
       </p:grpSpPr>
-      <p:sp>
-        <p:nvSpPr>
-          <p:cNvPr id="2" name="Nadpis 1">
-            <a:extLst>
-              <a:ext uri="{FF2B5EF4-FFF2-40B4-BE49-F238E27FC236}">
-                <a16:creationId xmlns:a16="http://schemas.microsoft.com/office/drawing/2014/main" id="{2C9FB25A-0F4B-AADB-3B8F-DFA33F3F46F3}"/>
-              </a:ext>
-            </a:extLst>
-          </p:cNvPr>
-          <p:cNvSpPr>
-            <a:spLocks noGrp="1"/>
-          </p:cNvSpPr>
-          <p:nvPr>
-            <p:ph type="title"/>
-          </p:nvPr>
-        </p:nvSpPr>
-        <p:spPr/>
-        <p:txBody>
-          <a:bodyPr/>
-          <a:lstStyle/>
-          <a:p>
-            <a:endParaRPr lang="sk-SK"/>
-          </a:p>
-        </p:txBody>
-      </p:sp>
-      <p:sp>
-        <p:nvSpPr>
-          <p:cNvPr id="3" name="Zástupný objekt pre obsah 2">
-            <a:extLst>
-              <a:ext uri="{FF2B5EF4-FFF2-40B4-BE49-F238E27FC236}">
-                <a16:creationId xmlns:a16="http://schemas.microsoft.com/office/drawing/2014/main" id="{0AEB9EB3-39C8-593E-C59C-8072ABD8C950}"/>
-              </a:ext>
-            </a:extLst>
-          </p:cNvPr>
-          <p:cNvSpPr>
-            <a:spLocks noGrp="1"/>
-          </p:cNvSpPr>
-          <p:nvPr>
-            <p:ph idx="1"/>
-          </p:nvPr>
-        </p:nvSpPr>
-        <p:spPr/>
-        <p:txBody>
-          <a:bodyPr/>
-          <a:lstStyle/>
-          <a:p>
-            <a:endParaRPr lang="sk-SK"/>
-          </a:p>
-        </p:txBody>
-      </p:sp>
     </p:spTree>
     <p:extLst>
       <p:ext uri="{BB962C8B-B14F-4D97-AF65-F5344CB8AC3E}">

</xml_diff>